<commit_message>
Update presentation script and generated PPTX with corrected analysis
- Updated content to reflect accurate agent counts and availability
- Improved slide formatting and layout
- Added detailed statistics and recommendations
- Updated image paths and subtitles
</commit_message>
<xml_diff>
--- a/Assessment_03/output/Presentation/team_availability_analysis.pptx
+++ b/Assessment_03/output/Presentation/team_availability_analysis.pptx
@@ -11,11 +11,8 @@
     <p:sldId id="259" r:id="rId10"/>
     <p:sldId id="260" r:id="rId11"/>
     <p:sldId id="261" r:id="rId12"/>
-    <p:sldId id="262" r:id="rId13"/>
-    <p:sldId id="263" r:id="rId14"/>
-    <p:sldId id="264" r:id="rId15"/>
   </p:sldIdLst>
-  <p:sldSz cx="14630400" cy="8229600" type="screen4x3"/>
+  <p:sldSz cx="9144000" cy="6858000" type="screen4x3"/>
   <p:notesSz cx="6858000" cy="9144000"/>
   <p:defaultTextStyle>
     <a:defPPr>
@@ -3115,7 +3112,7 @@
               <a:defRPr sz="4400" b="1"/>
             </a:pPr>
             <a:r>
-              <a:t>Team Availability Analysis 📊</a:t>
+              <a:t>Team Availability Analysis</a:t>
             </a:r>
           </a:p>
         </p:txBody>
@@ -3177,11 +3174,8 @@
           <a:bodyPr/>
           <a:lstStyle/>
           <a:p>
-            <a:pPr>
-              <a:defRPr sz="3600"/>
-            </a:pPr>
-            <a:r>
-              <a:t>Service Line Requirements 📋</a:t>
+            <a:r>
+              <a:t>Service Line Requirements</a:t>
             </a:r>
           </a:p>
         </p:txBody>
@@ -3200,18 +3194,20 @@
         <p:txBody>
           <a:bodyPr/>
           <a:lstStyle/>
-          <a:p/>
           <a:p>
             <a:pPr>
               <a:defRPr sz="1800"/>
             </a:pPr>
+            <a:r>
+              <a:t>Service Line Requirements:</a:t>
+            </a:r>
           </a:p>
           <a:p>
             <a:pPr>
               <a:defRPr sz="1800"/>
             </a:pPr>
             <a:r>
-              <a:t>Minimum Staffing Requirements:</a:t>
+              <a:t>• Service Line 1: 2.5 agents</a:t>
             </a:r>
           </a:p>
           <a:p>
@@ -3219,7 +3215,7 @@
               <a:defRPr sz="1800"/>
             </a:pPr>
             <a:r>
-              <a:t>• Service Line 1: 2.5 agents</a:t>
+              <a:t>• Service Line 2: 4 agents</a:t>
             </a:r>
           </a:p>
           <a:p>
@@ -3227,34 +3223,21 @@
               <a:defRPr sz="1800"/>
             </a:pPr>
             <a:r>
-              <a:t>• Service Line 2: 4.0 agents</a:t>
+              <a:t>• Service Line 3: 18 agents</a:t>
             </a:r>
           </a:p>
           <a:p>
             <a:pPr>
               <a:defRPr sz="1800"/>
             </a:pPr>
-            <a:r>
-              <a:t>• Service Line 3: 18.0 agents</a:t>
-            </a:r>
           </a:p>
           <a:p>
             <a:pPr>
               <a:defRPr sz="1800"/>
             </a:pPr>
-          </a:p>
-          <a:p>
-            <a:pPr>
-              <a:defRPr sz="1800"/>
-            </a:pPr>
             <a:r>
               <a:t>Total required: 24.5 agents for smooth operations</a:t>
             </a:r>
-          </a:p>
-          <a:p>
-            <a:pPr>
-              <a:defRPr sz="1800"/>
-            </a:pPr>
           </a:p>
         </p:txBody>
       </p:sp>
@@ -3291,11 +3274,8 @@
           <a:bodyPr/>
           <a:lstStyle/>
           <a:p>
-            <a:pPr>
-              <a:defRPr sz="3600"/>
-            </a:pPr>
-            <a:r>
-              <a:t>Daily Availability Overview 📈</a:t>
+            <a:r>
+              <a:t>Daily Availability Overview</a:t>
             </a:r>
           </a:p>
         </p:txBody>
@@ -3314,66 +3294,20 @@
         <p:txBody>
           <a:bodyPr/>
           <a:lstStyle/>
-          <a:p/>
-        </p:txBody>
-      </p:sp>
-      <p:pic>
-        <p:nvPicPr>
-          <p:cNvPr id="4" name="Picture 3" descr="daily_availability.png"/>
-          <p:cNvPicPr>
-            <a:picLocks noChangeAspect="1"/>
-          </p:cNvPicPr>
-          <p:nvPr/>
-        </p:nvPicPr>
-        <p:blipFill>
-          <a:blip r:embed="rId2"/>
-          <a:stretch>
-            <a:fillRect/>
-          </a:stretch>
-        </p:blipFill>
-        <p:spPr>
-          <a:xfrm>
-            <a:off x="914400" y="1828800"/>
-            <a:ext cx="3657600" cy="3657600"/>
-          </a:xfrm>
-          <a:prstGeom prst="rect">
-            <a:avLst/>
-          </a:prstGeom>
-        </p:spPr>
-      </p:pic>
-      <p:sp>
-        <p:nvSpPr>
-          <p:cNvPr id="5" name="TextBox 4"/>
-          <p:cNvSpPr txBox="1"/>
-          <p:nvPr/>
-        </p:nvSpPr>
-        <p:spPr>
-          <a:xfrm>
-            <a:off x="5486400" y="1828800"/>
-            <a:ext cx="3657600" cy="3657600"/>
-          </a:xfrm>
-          <a:prstGeom prst="rect">
-            <a:avLst/>
-          </a:prstGeom>
-          <a:noFill/>
-        </p:spPr>
-        <p:txBody>
-          <a:bodyPr wrap="none">
-            <a:spAutoFit/>
-          </a:bodyPr>
-          <a:lstStyle/>
-          <a:p/>
           <a:p>
             <a:pPr>
               <a:defRPr sz="1800"/>
             </a:pPr>
+            <a:r>
+              <a:t>Key Statistics:</a:t>
+            </a:r>
           </a:p>
           <a:p>
             <a:pPr>
               <a:defRPr sz="1800"/>
             </a:pPr>
             <a:r>
-              <a:t>Key Findings:</a:t>
+              <a:t>• Total number of agents: 29</a:t>
             </a:r>
           </a:p>
           <a:p>
@@ -3381,7 +3315,7 @@
               <a:defRPr sz="1800"/>
             </a:pPr>
             <a:r>
-              <a:t>• Average daily availability: 2.0 agents</a:t>
+              <a:t>• Average daily available agents: 24.03</a:t>
             </a:r>
           </a:p>
           <a:p>
@@ -3389,7 +3323,7 @@
               <a:defRPr sz="1800"/>
             </a:pPr>
             <a:r>
-              <a:t>• Maximum availability: 4 agents</a:t>
+              <a:t>• Maximum available agents: 29.00</a:t>
             </a:r>
           </a:p>
           <a:p>
@@ -3397,7 +3331,7 @@
               <a:defRPr sz="1800"/>
             </a:pPr>
             <a:r>
-              <a:t>• Minimum availability: 0 agents</a:t>
+              <a:t>• Days meeting requirements: 16 days</a:t>
             </a:r>
           </a:p>
           <a:p>
@@ -3405,13 +3339,8 @@
               <a:defRPr sz="1800"/>
             </a:pPr>
             <a:r>
-              <a:t>• Consistent staffing gaps in Service Line 3</a:t>
-            </a:r>
-          </a:p>
-          <a:p>
-            <a:pPr>
-              <a:defRPr sz="1800"/>
-            </a:pPr>
+              <a:t>• Days below requirements: 8 days</a:t>
+            </a:r>
           </a:p>
         </p:txBody>
       </p:sp>
@@ -3449,34 +3378,17 @@
           <a:lstStyle/>
           <a:p>
             <a:pPr>
-              <a:defRPr sz="3600"/>
+              <a:defRPr sz="3200"/>
             </a:pPr>
             <a:r>
-              <a:t>Weekly Patterns 📅</a:t>
-            </a:r>
-          </a:p>
-        </p:txBody>
-      </p:sp>
-      <p:sp>
-        <p:nvSpPr>
-          <p:cNvPr id="3" name="Content Placeholder 2"/>
-          <p:cNvSpPr>
-            <a:spLocks noGrp="1"/>
-          </p:cNvSpPr>
-          <p:nvPr>
-            <p:ph idx="1"/>
-          </p:nvPr>
-        </p:nvSpPr>
-        <p:spPr/>
-        <p:txBody>
-          <a:bodyPr/>
-          <a:lstStyle/>
-          <a:p/>
+              <a:t>Daily Team Availability</a:t>
+            </a:r>
+          </a:p>
         </p:txBody>
       </p:sp>
       <p:pic>
         <p:nvPicPr>
-          <p:cNvPr id="4" name="Picture 3" descr="weekly_pattern.png"/>
+          <p:cNvPr id="3" name="Picture 2" descr="daily_availability.png"/>
           <p:cNvPicPr>
             <a:picLocks noChangeAspect="1"/>
           </p:cNvPicPr>
@@ -3490,8 +3402,8 @@
         </p:blipFill>
         <p:spPr>
           <a:xfrm>
-            <a:off x="914400" y="1828800"/>
-            <a:ext cx="3657600" cy="3657600"/>
+            <a:off x="914400" y="1371600"/>
+            <a:ext cx="7315200" cy="4572000"/>
           </a:xfrm>
           <a:prstGeom prst="rect">
             <a:avLst/>
@@ -3500,14 +3412,14 @@
       </p:pic>
       <p:sp>
         <p:nvSpPr>
-          <p:cNvPr id="5" name="TextBox 4"/>
+          <p:cNvPr id="4" name="TextBox 3"/>
           <p:cNvSpPr txBox="1"/>
           <p:nvPr/>
         </p:nvSpPr>
         <p:spPr>
           <a:xfrm>
-            <a:off x="5486400" y="1828800"/>
-            <a:ext cx="3657600" cy="3657600"/>
+            <a:off x="914400" y="5943600"/>
+            <a:ext cx="7315200" cy="914400"/>
           </a:xfrm>
           <a:prstGeom prst="rect">
             <a:avLst/>
@@ -3521,54 +3433,12 @@
           <a:lstStyle/>
           <a:p/>
           <a:p>
-            <a:pPr>
-              <a:defRPr sz="1800"/>
+            <a:pPr algn="ctr">
+              <a:defRPr sz="1400"/>
             </a:pPr>
-          </a:p>
-          <a:p>
-            <a:pPr>
-              <a:defRPr sz="1800"/>
-            </a:pPr>
-            <a:r>
-              <a:t>Weekly Analysis:</a:t>
-            </a:r>
-          </a:p>
-          <a:p>
-            <a:pPr>
-              <a:defRPr sz="1800"/>
-            </a:pPr>
-            <a:r>
-              <a:t>• Highest availability: Friday (2.2 agents)</a:t>
-            </a:r>
-          </a:p>
-          <a:p>
-            <a:pPr>
-              <a:defRPr sz="1800"/>
-            </a:pPr>
-            <a:r>
-              <a:t>• Lowest availability: Wednesday (1.8 agents)</a:t>
-            </a:r>
-          </a:p>
-          <a:p>
-            <a:pPr>
-              <a:defRPr sz="1800"/>
-            </a:pPr>
-            <a:r>
-              <a:t>• Weekend coverage requires attention</a:t>
-            </a:r>
-          </a:p>
-          <a:p>
-            <a:pPr>
-              <a:defRPr sz="1800"/>
-            </a:pPr>
-            <a:r>
-              <a:t>• Mid-week peaks in attendance</a:t>
-            </a:r>
-          </a:p>
-          <a:p>
-            <a:pPr>
-              <a:defRPr sz="1800"/>
-            </a:pPr>
+            <a:r>
+              <a:t>Daily availability trend showing actual vs required staffing levels</a:t>
+            </a:r>
           </a:p>
         </p:txBody>
       </p:sp>
@@ -3606,34 +3476,17 @@
           <a:lstStyle/>
           <a:p>
             <a:pPr>
-              <a:defRPr sz="3600"/>
+              <a:defRPr sz="3200"/>
             </a:pPr>
             <a:r>
-              <a:t>Staffing Gaps Analysis ⚠️</a:t>
-            </a:r>
-          </a:p>
-        </p:txBody>
-      </p:sp>
-      <p:sp>
-        <p:nvSpPr>
-          <p:cNvPr id="3" name="Content Placeholder 2"/>
-          <p:cNvSpPr>
-            <a:spLocks noGrp="1"/>
-          </p:cNvSpPr>
-          <p:nvPr>
-            <p:ph idx="1"/>
-          </p:nvPr>
-        </p:nvSpPr>
-        <p:spPr/>
-        <p:txBody>
-          <a:bodyPr/>
-          <a:lstStyle/>
-          <a:p/>
+              <a:t>Staffing Gaps Analysis</a:t>
+            </a:r>
+          </a:p>
         </p:txBody>
       </p:sp>
       <p:pic>
         <p:nvPicPr>
-          <p:cNvPr id="4" name="Picture 3" descr="staffing_gaps.png"/>
+          <p:cNvPr id="3" name="Picture 2" descr="staffing_gaps.png"/>
           <p:cNvPicPr>
             <a:picLocks noChangeAspect="1"/>
           </p:cNvPicPr>
@@ -3647,8 +3500,8 @@
         </p:blipFill>
         <p:spPr>
           <a:xfrm>
-            <a:off x="914400" y="1828800"/>
-            <a:ext cx="3657600" cy="3657600"/>
+            <a:off x="914400" y="1371600"/>
+            <a:ext cx="7315200" cy="4572000"/>
           </a:xfrm>
           <a:prstGeom prst="rect">
             <a:avLst/>
@@ -3657,14 +3510,14 @@
       </p:pic>
       <p:sp>
         <p:nvSpPr>
-          <p:cNvPr id="5" name="TextBox 4"/>
+          <p:cNvPr id="4" name="TextBox 3"/>
           <p:cNvSpPr txBox="1"/>
           <p:nvPr/>
         </p:nvSpPr>
         <p:spPr>
           <a:xfrm>
-            <a:off x="5486400" y="1828800"/>
-            <a:ext cx="3657600" cy="3657600"/>
+            <a:off x="914400" y="5943600"/>
+            <a:ext cx="7315200" cy="914400"/>
           </a:xfrm>
           <a:prstGeom prst="rect">
             <a:avLst/>
@@ -3678,46 +3531,12 @@
           <a:lstStyle/>
           <a:p/>
           <a:p>
-            <a:pPr>
-              <a:defRPr sz="1800"/>
+            <a:pPr algn="ctr">
+              <a:defRPr sz="1400"/>
             </a:pPr>
-          </a:p>
-          <a:p>
-            <a:pPr>
-              <a:defRPr sz="1800"/>
-            </a:pPr>
-            <a:r>
-              <a:t>Service Line Analysis:</a:t>
-            </a:r>
-          </a:p>
-          <a:p>
-            <a:pPr>
-              <a:defRPr sz="1800"/>
-            </a:pPr>
-            <a:r>
-              <a:t>• Service Line 1: Generally manageable</a:t>
-            </a:r>
-          </a:p>
-          <a:p>
-            <a:pPr>
-              <a:defRPr sz="1800"/>
-            </a:pPr>
-            <a:r>
-              <a:t>• Service Line 2: Occasional shortages</a:t>
-            </a:r>
-          </a:p>
-          <a:p>
-            <a:pPr>
-              <a:defRPr sz="1800"/>
-            </a:pPr>
-            <a:r>
-              <a:t>• Service Line 3: Significant understaffing</a:t>
-            </a:r>
-          </a:p>
-          <a:p>
-            <a:pPr>
-              <a:defRPr sz="1800"/>
-            </a:pPr>
+            <a:r>
+              <a:t>Red bars indicate understaffing, green bars indicate surplus staffing</a:t>
+            </a:r>
           </a:p>
         </p:txBody>
       </p:sp>
@@ -3754,11 +3573,8 @@
           <a:bodyPr/>
           <a:lstStyle/>
           <a:p>
-            <a:pPr>
-              <a:defRPr sz="3600"/>
-            </a:pPr>
-            <a:r>
-              <a:t>Monthly Statistics 📊</a:t>
+            <a:r>
+              <a:t>Recommendations</a:t>
             </a:r>
           </a:p>
         </p:txBody>
@@ -3777,18 +3593,20 @@
         <p:txBody>
           <a:bodyPr/>
           <a:lstStyle/>
-          <a:p/>
           <a:p>
             <a:pPr>
               <a:defRPr sz="1800"/>
             </a:pPr>
+            <a:r>
+              <a:t>Action Items:</a:t>
+            </a:r>
           </a:p>
           <a:p>
             <a:pPr>
               <a:defRPr sz="1800"/>
             </a:pPr>
             <a:r>
-              <a:t>August 2022 Overview:</a:t>
+              <a:t>• Implement better leave management to prevent understaffing</a:t>
             </a:r>
           </a:p>
           <a:p>
@@ -3796,7 +3614,7 @@
               <a:defRPr sz="1800"/>
             </a:pPr>
             <a:r>
-              <a:t>• Total working days: 31</a:t>
+              <a:t>• Consider additional backup staff for high-absence days</a:t>
             </a:r>
           </a:p>
           <a:p>
@@ -3804,7 +3622,7 @@
               <a:defRPr sz="1800"/>
             </a:pPr>
             <a:r>
-              <a:t>• Days meeting requirements: 0 (0%)</a:t>
+              <a:t>• Review partial availability patterns to optimize scheduling</a:t>
             </a:r>
           </a:p>
           <a:p>
@@ -3812,348 +3630,8 @@
               <a:defRPr sz="1800"/>
             </a:pPr>
             <a:r>
-              <a:t>• Days below requirements: 31 (100%)</a:t>
-            </a:r>
-          </a:p>
-          <a:p>
-            <a:pPr>
-              <a:defRPr sz="1800"/>
-            </a:pPr>
-            <a:r>
-              <a:t>• Average daily shortage: 22.5 agents</a:t>
-            </a:r>
-          </a:p>
-          <a:p>
-            <a:pPr>
-              <a:defRPr sz="1800"/>
-            </a:pPr>
-          </a:p>
-        </p:txBody>
-      </p:sp>
-    </p:spTree>
-  </p:cSld>
-  <p:clrMapOvr>
-    <a:masterClrMapping/>
-  </p:clrMapOvr>
-</p:sld>
-</file>
-
-<file path=ppt/slides/slide7.xml><?xml version="1.0" encoding="utf-8"?>
-<p:sld xmlns:a="http://schemas.openxmlformats.org/drawingml/2006/main" xmlns:p="http://schemas.openxmlformats.org/presentationml/2006/main" xmlns:r="http://schemas.openxmlformats.org/officeDocument/2006/relationships">
-  <p:cSld>
-    <p:spTree>
-      <p:nvGrpSpPr>
-        <p:cNvPr id="1" name=""/>
-        <p:cNvGrpSpPr/>
-        <p:nvPr/>
-      </p:nvGrpSpPr>
-      <p:grpSpPr/>
-      <p:sp>
-        <p:nvSpPr>
-          <p:cNvPr id="2" name="Title 1"/>
-          <p:cNvSpPr>
-            <a:spLocks noGrp="1"/>
-          </p:cNvSpPr>
-          <p:nvPr>
-            <p:ph type="title"/>
-          </p:nvPr>
-        </p:nvSpPr>
-        <p:spPr/>
-        <p:txBody>
-          <a:bodyPr/>
-          <a:lstStyle/>
-          <a:p>
-            <a:pPr>
-              <a:defRPr sz="3600"/>
-            </a:pPr>
-            <a:r>
-              <a:t>Critical Findings 🔍</a:t>
-            </a:r>
-          </a:p>
-        </p:txBody>
-      </p:sp>
-      <p:sp>
-        <p:nvSpPr>
-          <p:cNvPr id="3" name="Content Placeholder 2"/>
-          <p:cNvSpPr>
-            <a:spLocks noGrp="1"/>
-          </p:cNvSpPr>
-          <p:nvPr>
-            <p:ph idx="1"/>
-          </p:nvPr>
-        </p:nvSpPr>
-        <p:spPr/>
-        <p:txBody>
-          <a:bodyPr/>
-          <a:lstStyle/>
-          <a:p/>
-          <a:p>
-            <a:pPr>
-              <a:defRPr sz="1800"/>
-            </a:pPr>
-          </a:p>
-          <a:p>
-            <a:pPr>
-              <a:defRPr sz="1800"/>
-            </a:pPr>
-            <a:r>
-              <a:t>Key Issues Identified:</a:t>
-            </a:r>
-          </a:p>
-          <a:p>
-            <a:pPr>
-              <a:defRPr sz="1800"/>
-            </a:pPr>
-            <a:r>
-              <a:t>• Consistent understaffing in Service Line 3</a:t>
-            </a:r>
-          </a:p>
-          <a:p>
-            <a:pPr>
-              <a:defRPr sz="1800"/>
-            </a:pPr>
-            <a:r>
-              <a:t>• Friday staffing levels particularly concerning</a:t>
-            </a:r>
-          </a:p>
-          <a:p>
-            <a:pPr>
-              <a:defRPr sz="1800"/>
-            </a:pPr>
-            <a:r>
-              <a:t>• Weekend coverage gaps</a:t>
-            </a:r>
-          </a:p>
-          <a:p>
-            <a:pPr>
-              <a:defRPr sz="1800"/>
-            </a:pPr>
-            <a:r>
-              <a:t>• No days meet minimum requirements</a:t>
-            </a:r>
-          </a:p>
-          <a:p>
-            <a:pPr>
-              <a:defRPr sz="1800"/>
-            </a:pPr>
-          </a:p>
-        </p:txBody>
-      </p:sp>
-    </p:spTree>
-  </p:cSld>
-  <p:clrMapOvr>
-    <a:masterClrMapping/>
-  </p:clrMapOvr>
-</p:sld>
-</file>
-
-<file path=ppt/slides/slide8.xml><?xml version="1.0" encoding="utf-8"?>
-<p:sld xmlns:a="http://schemas.openxmlformats.org/drawingml/2006/main" xmlns:p="http://schemas.openxmlformats.org/presentationml/2006/main" xmlns:r="http://schemas.openxmlformats.org/officeDocument/2006/relationships">
-  <p:cSld>
-    <p:spTree>
-      <p:nvGrpSpPr>
-        <p:cNvPr id="1" name=""/>
-        <p:cNvGrpSpPr/>
-        <p:nvPr/>
-      </p:nvGrpSpPr>
-      <p:grpSpPr/>
-      <p:sp>
-        <p:nvSpPr>
-          <p:cNvPr id="2" name="Title 1"/>
-          <p:cNvSpPr>
-            <a:spLocks noGrp="1"/>
-          </p:cNvSpPr>
-          <p:nvPr>
-            <p:ph type="title"/>
-          </p:nvPr>
-        </p:nvSpPr>
-        <p:spPr/>
-        <p:txBody>
-          <a:bodyPr/>
-          <a:lstStyle/>
-          <a:p>
-            <a:pPr>
-              <a:defRPr sz="3600"/>
-            </a:pPr>
-            <a:r>
-              <a:t>Recommendations ✨</a:t>
-            </a:r>
-          </a:p>
-        </p:txBody>
-      </p:sp>
-      <p:sp>
-        <p:nvSpPr>
-          <p:cNvPr id="3" name="Content Placeholder 2"/>
-          <p:cNvSpPr>
-            <a:spLocks noGrp="1"/>
-          </p:cNvSpPr>
-          <p:nvPr>
-            <p:ph idx="1"/>
-          </p:nvPr>
-        </p:nvSpPr>
-        <p:spPr/>
-        <p:txBody>
-          <a:bodyPr/>
-          <a:lstStyle/>
-          <a:p/>
-          <a:p>
-            <a:pPr>
-              <a:defRPr sz="1800"/>
-            </a:pPr>
-          </a:p>
-          <a:p>
-            <a:pPr>
-              <a:defRPr sz="1800"/>
-            </a:pPr>
-            <a:r>
-              <a:t>Immediate Actions Needed:</a:t>
-            </a:r>
-          </a:p>
-          <a:p>
-            <a:pPr>
-              <a:defRPr sz="1800"/>
-            </a:pPr>
-            <a:r>
-              <a:t>1. Prioritize recruitment to meet Service Line 3 requirements</a:t>
-            </a:r>
-          </a:p>
-          <a:p>
-            <a:pPr>
-              <a:defRPr sz="1800"/>
-            </a:pPr>
-            <a:r>
-              <a:t>2. Implement temporary staff augmentation</a:t>
-            </a:r>
-          </a:p>
-          <a:p>
-            <a:pPr>
-              <a:defRPr sz="1800"/>
-            </a:pPr>
-            <a:r>
-              <a:t>3. Review and optimize leave management</a:t>
-            </a:r>
-          </a:p>
-          <a:p>
-            <a:pPr>
-              <a:defRPr sz="1800"/>
-            </a:pPr>
-            <a:r>
-              <a:t>4. Develop flexible scheduling</a:t>
-            </a:r>
-          </a:p>
-          <a:p>
-            <a:pPr>
-              <a:defRPr sz="1800"/>
-            </a:pPr>
-          </a:p>
-        </p:txBody>
-      </p:sp>
-    </p:spTree>
-  </p:cSld>
-  <p:clrMapOvr>
-    <a:masterClrMapping/>
-  </p:clrMapOvr>
-</p:sld>
-</file>
-
-<file path=ppt/slides/slide9.xml><?xml version="1.0" encoding="utf-8"?>
-<p:sld xmlns:a="http://schemas.openxmlformats.org/drawingml/2006/main" xmlns:p="http://schemas.openxmlformats.org/presentationml/2006/main" xmlns:r="http://schemas.openxmlformats.org/officeDocument/2006/relationships">
-  <p:cSld>
-    <p:spTree>
-      <p:nvGrpSpPr>
-        <p:cNvPr id="1" name=""/>
-        <p:cNvGrpSpPr/>
-        <p:nvPr/>
-      </p:nvGrpSpPr>
-      <p:grpSpPr/>
-      <p:sp>
-        <p:nvSpPr>
-          <p:cNvPr id="2" name="Title 1"/>
-          <p:cNvSpPr>
-            <a:spLocks noGrp="1"/>
-          </p:cNvSpPr>
-          <p:nvPr>
-            <p:ph type="title"/>
-          </p:nvPr>
-        </p:nvSpPr>
-        <p:spPr/>
-        <p:txBody>
-          <a:bodyPr/>
-          <a:lstStyle/>
-          <a:p>
-            <a:pPr>
-              <a:defRPr sz="3600"/>
-            </a:pPr>
-            <a:r>
-              <a:t>Next Steps 🎯</a:t>
-            </a:r>
-          </a:p>
-        </p:txBody>
-      </p:sp>
-      <p:sp>
-        <p:nvSpPr>
-          <p:cNvPr id="3" name="Content Placeholder 2"/>
-          <p:cNvSpPr>
-            <a:spLocks noGrp="1"/>
-          </p:cNvSpPr>
-          <p:nvPr>
-            <p:ph idx="1"/>
-          </p:nvPr>
-        </p:nvSpPr>
-        <p:spPr/>
-        <p:txBody>
-          <a:bodyPr/>
-          <a:lstStyle/>
-          <a:p/>
-          <a:p>
-            <a:pPr>
-              <a:defRPr sz="1800"/>
-            </a:pPr>
-          </a:p>
-          <a:p>
-            <a:pPr>
-              <a:defRPr sz="1800"/>
-            </a:pPr>
-            <a:r>
-              <a:t>Action Plan:</a:t>
-            </a:r>
-          </a:p>
-          <a:p>
-            <a:pPr>
-              <a:defRPr sz="1800"/>
-            </a:pPr>
-            <a:r>
-              <a:t>1. Short-term: Optimize current staff distribution</a:t>
-            </a:r>
-          </a:p>
-          <a:p>
-            <a:pPr>
-              <a:defRPr sz="1800"/>
-            </a:pPr>
-            <a:r>
-              <a:t>2. Medium-term: Recruit additional staff</a:t>
-            </a:r>
-          </a:p>
-          <a:p>
-            <a:pPr>
-              <a:defRPr sz="1800"/>
-            </a:pPr>
-            <a:r>
-              <a:t>3. Long-term: Implement workforce management system</a:t>
-            </a:r>
-          </a:p>
-          <a:p>
-            <a:pPr>
-              <a:defRPr sz="1800"/>
-            </a:pPr>
-            <a:r>
-              <a:t>4. Regular monitoring and adjustment</a:t>
-            </a:r>
-          </a:p>
-          <a:p>
-            <a:pPr>
-              <a:defRPr sz="1800"/>
-            </a:pPr>
+              <a:t>• Develop contingency plans for days with known staffing gaps</a:t>
+            </a:r>
           </a:p>
         </p:txBody>
       </p:sp>

</xml_diff>

<commit_message>
Update team availability analysis
Changes:
- Corrected statistics and analysis
- Improved markdown documentation structure
- Updated presentation with better formatting
- Cleaned up script files
- Added detailed recommendations and action plan
</commit_message>
<xml_diff>
--- a/Assessment_03/output/Presentation/team_availability_analysis.pptx
+++ b/Assessment_03/output/Presentation/team_availability_analysis.pptx
@@ -11,6 +11,8 @@
     <p:sldId id="259" r:id="rId10"/>
     <p:sldId id="260" r:id="rId11"/>
     <p:sldId id="261" r:id="rId12"/>
+    <p:sldId id="262" r:id="rId13"/>
+    <p:sldId id="263" r:id="rId14"/>
   </p:sldIdLst>
   <p:sldSz cx="9144000" cy="6858000" type="screen4x3"/>
   <p:notesSz cx="6858000" cy="9144000"/>
@@ -3108,9 +3110,6 @@
           <a:bodyPr/>
           <a:lstStyle/>
           <a:p>
-            <a:pPr>
-              <a:defRPr sz="4400" b="1"/>
-            </a:pPr>
             <a:r>
               <a:t>Team Availability Analysis</a:t>
             </a:r>
@@ -3132,11 +3131,13 @@
           <a:bodyPr/>
           <a:lstStyle/>
           <a:p>
-            <a:pPr>
-              <a:defRPr sz="2400"/>
-            </a:pPr>
-            <a:r>
-              <a:t>August 2022 Overview</a:t>
+            <a:r>
+              <a:t>August 2022</a:t>
+            </a:r>
+          </a:p>
+          <a:p>
+            <a:r>
+              <a:t>Analysis of staffing requirements and recommendations</a:t>
             </a:r>
           </a:p>
         </p:txBody>
@@ -3195,48 +3196,29 @@
           <a:bodyPr/>
           <a:lstStyle/>
           <a:p>
-            <a:pPr>
-              <a:defRPr sz="1800"/>
-            </a:pPr>
-            <a:r>
-              <a:t>Service Line Requirements:</a:t>
-            </a:r>
-          </a:p>
-          <a:p>
-            <a:pPr>
-              <a:defRPr sz="1800"/>
-            </a:pPr>
+            <a:r>
+              <a:t>Minimum Staffing Requirements:</a:t>
+            </a:r>
+          </a:p>
+          <a:p>
             <a:r>
               <a:t>• Service Line 1: 2.5 agents</a:t>
             </a:r>
           </a:p>
           <a:p>
-            <a:pPr>
-              <a:defRPr sz="1800"/>
-            </a:pPr>
-            <a:r>
-              <a:t>• Service Line 2: 4 agents</a:t>
-            </a:r>
-          </a:p>
-          <a:p>
-            <a:pPr>
-              <a:defRPr sz="1800"/>
-            </a:pPr>
-            <a:r>
-              <a:t>• Service Line 3: 18 agents</a:t>
-            </a:r>
-          </a:p>
-          <a:p>
-            <a:pPr>
-              <a:defRPr sz="1800"/>
-            </a:pPr>
-          </a:p>
-          <a:p>
-            <a:pPr>
-              <a:defRPr sz="1800"/>
-            </a:pPr>
-            <a:r>
-              <a:t>Total required: 24.5 agents for smooth operations</a:t>
+            <a:r>
+              <a:t>• Service Line 2: 4.0 agents</a:t>
+            </a:r>
+          </a:p>
+          <a:p>
+            <a:r>
+              <a:t>• Service Line 3: 18.0 agents</a:t>
+            </a:r>
+          </a:p>
+          <a:p>
+            <a:br/>
+            <a:r>
+              <a:t>Total Required: 24.5 agents</a:t>
             </a:r>
           </a:p>
         </p:txBody>
@@ -3275,7 +3257,7 @@
           <a:lstStyle/>
           <a:p>
             <a:r>
-              <a:t>Daily Availability Overview</a:t>
+              <a:t>Key Statistics</a:t>
             </a:r>
           </a:p>
         </p:txBody>
@@ -3295,51 +3277,38 @@
           <a:bodyPr/>
           <a:lstStyle/>
           <a:p>
-            <a:pPr>
-              <a:defRPr sz="1800"/>
-            </a:pPr>
-            <a:r>
-              <a:t>Key Statistics:</a:t>
-            </a:r>
-          </a:p>
-          <a:p>
-            <a:pPr>
-              <a:defRPr sz="1800"/>
-            </a:pPr>
-            <a:r>
-              <a:t>• Total number of agents: 29</a:t>
-            </a:r>
-          </a:p>
-          <a:p>
-            <a:pPr>
-              <a:defRPr sz="1800"/>
-            </a:pPr>
-            <a:r>
-              <a:t>• Average daily available agents: 24.03</a:t>
-            </a:r>
-          </a:p>
-          <a:p>
-            <a:pPr>
-              <a:defRPr sz="1800"/>
-            </a:pPr>
-            <a:r>
-              <a:t>• Maximum available agents: 29.00</a:t>
-            </a:r>
-          </a:p>
-          <a:p>
-            <a:pPr>
-              <a:defRPr sz="1800"/>
-            </a:pPr>
-            <a:r>
-              <a:t>• Days meeting requirements: 16 days</a:t>
-            </a:r>
-          </a:p>
-          <a:p>
-            <a:pPr>
-              <a:defRPr sz="1800"/>
-            </a:pPr>
-            <a:r>
-              <a:t>• Days below requirements: 8 days</a:t>
+            <a:r>
+              <a:t>• Total Agents: 30</a:t>
+            </a:r>
+          </a:p>
+          <a:p>
+            <a:r>
+              <a:t>• Working Days: 23 weekdays (Monday-Friday only)</a:t>
+            </a:r>
+          </a:p>
+          <a:p>
+            <a:r>
+              <a:t>• Average Daily Available Agents: 25.08</a:t>
+            </a:r>
+          </a:p>
+          <a:p>
+            <a:r>
+              <a:t>• Maximum Available: 29.00 agents</a:t>
+            </a:r>
+          </a:p>
+          <a:p>
+            <a:r>
+              <a:t>• Minimum Available: 21.00 agents</a:t>
+            </a:r>
+          </a:p>
+          <a:p>
+            <a:r>
+              <a:t>• Days Meeting Requirements: 16 days (≥24.5 agents)</a:t>
+            </a:r>
+          </a:p>
+          <a:p>
+            <a:r>
+              <a:t>• Days Below Requirements: 7 days (&lt;24.5 agents)</a:t>
             </a:r>
           </a:p>
         </p:txBody>
@@ -3377,67 +3346,60 @@
           <a:bodyPr/>
           <a:lstStyle/>
           <a:p>
-            <a:pPr>
-              <a:defRPr sz="3200"/>
-            </a:pPr>
-            <a:r>
-              <a:t>Daily Team Availability</a:t>
-            </a:r>
-          </a:p>
-        </p:txBody>
-      </p:sp>
-      <p:pic>
-        <p:nvPicPr>
-          <p:cNvPr id="3" name="Picture 2" descr="daily_availability.png"/>
-          <p:cNvPicPr>
-            <a:picLocks noChangeAspect="1"/>
-          </p:cNvPicPr>
-          <p:nvPr/>
-        </p:nvPicPr>
-        <p:blipFill>
-          <a:blip r:embed="rId2"/>
-          <a:stretch>
-            <a:fillRect/>
-          </a:stretch>
-        </p:blipFill>
-        <p:spPr>
-          <a:xfrm>
-            <a:off x="914400" y="1371600"/>
-            <a:ext cx="7315200" cy="4572000"/>
-          </a:xfrm>
-          <a:prstGeom prst="rect">
-            <a:avLst/>
-          </a:prstGeom>
-        </p:spPr>
-      </p:pic>
-      <p:sp>
-        <p:nvSpPr>
-          <p:cNvPr id="4" name="TextBox 3"/>
-          <p:cNvSpPr txBox="1"/>
-          <p:nvPr/>
-        </p:nvSpPr>
-        <p:spPr>
-          <a:xfrm>
-            <a:off x="914400" y="5943600"/>
-            <a:ext cx="7315200" cy="914400"/>
-          </a:xfrm>
-          <a:prstGeom prst="rect">
-            <a:avLst/>
-          </a:prstGeom>
-          <a:noFill/>
-        </p:spPr>
-        <p:txBody>
-          <a:bodyPr wrap="none">
-            <a:spAutoFit/>
-          </a:bodyPr>
-          <a:lstStyle/>
-          <a:p/>
-          <a:p>
-            <a:pPr algn="ctr">
-              <a:defRPr sz="1400"/>
-            </a:pPr>
-            <a:r>
-              <a:t>Daily availability trend showing actual vs required staffing levels</a:t>
+            <a:r>
+              <a:t>Staffing Analysis</a:t>
+            </a:r>
+          </a:p>
+        </p:txBody>
+      </p:sp>
+      <p:sp>
+        <p:nvSpPr>
+          <p:cNvPr id="3" name="Content Placeholder 2"/>
+          <p:cNvSpPr>
+            <a:spLocks noGrp="1"/>
+          </p:cNvSpPr>
+          <p:nvPr>
+            <p:ph idx="1"/>
+          </p:nvPr>
+        </p:nvSpPr>
+        <p:spPr/>
+        <p:txBody>
+          <a:bodyPr/>
+          <a:lstStyle/>
+          <a:p>
+            <a:r>
+              <a:t>Coverage Rate:</a:t>
+            </a:r>
+          </a:p>
+          <a:p>
+            <a:r>
+              <a:t>• 69.6% of weekdays met minimum requirement</a:t>
+            </a:r>
+          </a:p>
+          <a:p>
+            <a:r>
+              <a:t>• 30.4% of weekdays fell below requirement</a:t>
+            </a:r>
+          </a:p>
+          <a:p>
+            <a:br/>
+            <a:r>
+              <a:t>Staffing Buffer:</a:t>
+            </a:r>
+          </a:p>
+          <a:p>
+            <a:r>
+              <a:t>• Average surplus: 0.58 agents</a:t>
+            </a:r>
+          </a:p>
+          <a:p>
+            <a:r>
+              <a:t>• Maximum surplus: 4.5 agents</a:t>
+            </a:r>
+          </a:p>
+          <a:p>
+            <a:r>
+              <a:t>• Maximum deficit: 3.5 agents</a:t>
             </a:r>
           </a:p>
         </p:txBody>
@@ -3475,67 +3437,64 @@
           <a:bodyPr/>
           <a:lstStyle/>
           <a:p>
-            <a:pPr>
-              <a:defRPr sz="3200"/>
-            </a:pPr>
-            <a:r>
-              <a:t>Staffing Gaps Analysis</a:t>
-            </a:r>
-          </a:p>
-        </p:txBody>
-      </p:sp>
-      <p:pic>
-        <p:nvPicPr>
-          <p:cNvPr id="3" name="Picture 2" descr="staffing_gaps.png"/>
-          <p:cNvPicPr>
-            <a:picLocks noChangeAspect="1"/>
-          </p:cNvPicPr>
-          <p:nvPr/>
-        </p:nvPicPr>
-        <p:blipFill>
-          <a:blip r:embed="rId2"/>
-          <a:stretch>
-            <a:fillRect/>
-          </a:stretch>
-        </p:blipFill>
-        <p:spPr>
-          <a:xfrm>
-            <a:off x="914400" y="1371600"/>
-            <a:ext cx="7315200" cy="4572000"/>
-          </a:xfrm>
-          <a:prstGeom prst="rect">
-            <a:avLst/>
-          </a:prstGeom>
-        </p:spPr>
-      </p:pic>
-      <p:sp>
-        <p:nvSpPr>
-          <p:cNvPr id="4" name="TextBox 3"/>
-          <p:cNvSpPr txBox="1"/>
-          <p:nvPr/>
-        </p:nvSpPr>
-        <p:spPr>
-          <a:xfrm>
-            <a:off x="914400" y="5943600"/>
-            <a:ext cx="7315200" cy="914400"/>
-          </a:xfrm>
-          <a:prstGeom prst="rect">
-            <a:avLst/>
-          </a:prstGeom>
-          <a:noFill/>
-        </p:spPr>
-        <p:txBody>
-          <a:bodyPr wrap="none">
-            <a:spAutoFit/>
-          </a:bodyPr>
-          <a:lstStyle/>
-          <a:p/>
-          <a:p>
-            <a:pPr algn="ctr">
-              <a:defRPr sz="1400"/>
-            </a:pPr>
-            <a:r>
-              <a:t>Red bars indicate understaffing, green bars indicate surplus staffing</a:t>
+            <a:r>
+              <a:t>Critical Issues</a:t>
+            </a:r>
+          </a:p>
+        </p:txBody>
+      </p:sp>
+      <p:sp>
+        <p:nvSpPr>
+          <p:cNvPr id="3" name="Content Placeholder 2"/>
+          <p:cNvSpPr>
+            <a:spLocks noGrp="1"/>
+          </p:cNvSpPr>
+          <p:nvPr>
+            <p:ph idx="1"/>
+          </p:nvPr>
+        </p:nvSpPr>
+        <p:spPr/>
+        <p:txBody>
+          <a:bodyPr/>
+          <a:lstStyle/>
+          <a:p>
+            <a:r>
+              <a:t>Staffing Gaps:</a:t>
+            </a:r>
+          </a:p>
+          <a:p>
+            <a:r>
+              <a:t>• Highest gaps in third week of August</a:t>
+            </a:r>
+          </a:p>
+          <a:p>
+            <a:r>
+              <a:t>• Friday staffing levels show shortages</a:t>
+            </a:r>
+          </a:p>
+          <a:p>
+            <a:r>
+              <a:t>• 7 days (30.4%) below requirements</a:t>
+            </a:r>
+          </a:p>
+          <a:p>
+            <a:r>
+              <a:t>Resource Management:</a:t>
+            </a:r>
+          </a:p>
+          <a:p>
+            <a:r>
+              <a:t>• Uneven distribution of leave days</a:t>
+            </a:r>
+          </a:p>
+          <a:p>
+            <a:r>
+              <a:t>• Limited buffer for unexpected absences</a:t>
+            </a:r>
+          </a:p>
+          <a:p>
+            <a:r>
+              <a:t>• Peak vacation period impacts</a:t>
             </a:r>
           </a:p>
         </p:txBody>
@@ -3594,47 +3553,247 @@
           <a:bodyPr/>
           <a:lstStyle/>
           <a:p>
-            <a:pPr>
-              <a:defRPr sz="1800"/>
-            </a:pPr>
-            <a:r>
-              <a:t>Action Items:</a:t>
-            </a:r>
-          </a:p>
-          <a:p>
-            <a:pPr>
-              <a:defRPr sz="1800"/>
-            </a:pPr>
-            <a:r>
-              <a:t>• Implement better leave management to prevent understaffing</a:t>
-            </a:r>
-          </a:p>
-          <a:p>
-            <a:pPr>
-              <a:defRPr sz="1800"/>
-            </a:pPr>
-            <a:r>
-              <a:t>• Consider additional backup staff for high-absence days</a:t>
-            </a:r>
-          </a:p>
-          <a:p>
-            <a:pPr>
-              <a:defRPr sz="1800"/>
-            </a:pPr>
-            <a:r>
-              <a:t>• Review partial availability patterns to optimize scheduling</a:t>
-            </a:r>
-          </a:p>
-          <a:p>
-            <a:pPr>
-              <a:defRPr sz="1800"/>
-            </a:pPr>
-            <a:r>
-              <a:t>• Develop contingency plans for days with known staffing gaps</a:t>
-            </a:r>
-          </a:p>
-        </p:txBody>
-      </p:sp>
+            <a:r>
+              <a:t>Leave Management:</a:t>
+            </a:r>
+          </a:p>
+          <a:p>
+            <a:r>
+              <a:t>• Implement structured approval process</a:t>
+            </a:r>
+          </a:p>
+          <a:p>
+            <a:r>
+              <a:t>• Stagger vacation schedules</a:t>
+            </a:r>
+          </a:p>
+          <a:p>
+            <a:r>
+              <a:t>• Set concurrent leave limits</a:t>
+            </a:r>
+          </a:p>
+          <a:p>
+            <a:r>
+              <a:t>Staffing Adjustments:</a:t>
+            </a:r>
+          </a:p>
+          <a:p>
+            <a:r>
+              <a:t>• Add 1-2 additional agents</a:t>
+            </a:r>
+          </a:p>
+          <a:p>
+            <a:r>
+              <a:t>• Develop flexible staffing model</a:t>
+            </a:r>
+          </a:p>
+          <a:p>
+            <a:r>
+              <a:t>• Cross-train across service lines</a:t>
+            </a:r>
+          </a:p>
+          <a:p>
+            <a:r>
+              <a:t>Monitoring System:</a:t>
+            </a:r>
+          </a:p>
+          <a:p>
+            <a:r>
+              <a:t>• Implement daily tracking</a:t>
+            </a:r>
+          </a:p>
+          <a:p>
+            <a:r>
+              <a:t>• Set up shortage alerts</a:t>
+            </a:r>
+          </a:p>
+          <a:p>
+            <a:r>
+              <a:t>• Regular pattern analysis</a:t>
+            </a:r>
+          </a:p>
+        </p:txBody>
+      </p:sp>
+    </p:spTree>
+  </p:cSld>
+  <p:clrMapOvr>
+    <a:masterClrMapping/>
+  </p:clrMapOvr>
+</p:sld>
+</file>
+
+<file path=ppt/slides/slide7.xml><?xml version="1.0" encoding="utf-8"?>
+<p:sld xmlns:a="http://schemas.openxmlformats.org/drawingml/2006/main" xmlns:p="http://schemas.openxmlformats.org/presentationml/2006/main" xmlns:r="http://schemas.openxmlformats.org/officeDocument/2006/relationships">
+  <p:cSld>
+    <p:spTree>
+      <p:nvGrpSpPr>
+        <p:cNvPr id="1" name=""/>
+        <p:cNvGrpSpPr/>
+        <p:nvPr/>
+      </p:nvGrpSpPr>
+      <p:grpSpPr/>
+      <p:sp>
+        <p:nvSpPr>
+          <p:cNvPr id="2" name="Title 1"/>
+          <p:cNvSpPr>
+            <a:spLocks noGrp="1"/>
+          </p:cNvSpPr>
+          <p:nvPr>
+            <p:ph type="title"/>
+          </p:nvPr>
+        </p:nvSpPr>
+        <p:spPr/>
+        <p:txBody>
+          <a:bodyPr/>
+          <a:lstStyle/>
+          <a:p>
+            <a:r>
+              <a:t>Action Plan</a:t>
+            </a:r>
+          </a:p>
+        </p:txBody>
+      </p:sp>
+      <p:sp>
+        <p:nvSpPr>
+          <p:cNvPr id="3" name="Content Placeholder 2"/>
+          <p:cNvSpPr>
+            <a:spLocks noGrp="1"/>
+          </p:cNvSpPr>
+          <p:nvPr>
+            <p:ph idx="1"/>
+          </p:nvPr>
+        </p:nvSpPr>
+        <p:spPr/>
+        <p:txBody>
+          <a:bodyPr/>
+          <a:lstStyle/>
+          <a:p>
+            <a:r>
+              <a:t>Immediate (1-2 weeks):</a:t>
+            </a:r>
+          </a:p>
+          <a:p>
+            <a:r>
+              <a:t>• Review and optimize staff distribution</a:t>
+            </a:r>
+          </a:p>
+          <a:p>
+            <a:r>
+              <a:t>• Implement leave request coordination</a:t>
+            </a:r>
+          </a:p>
+          <a:p>
+            <a:r>
+              <a:t>Short-term (1-3 months):</a:t>
+            </a:r>
+          </a:p>
+          <a:p>
+            <a:r>
+              <a:t>• Begin recruitment for additional staff</a:t>
+            </a:r>
+          </a:p>
+          <a:p>
+            <a:r>
+              <a:t>• Develop cross-training program</a:t>
+            </a:r>
+          </a:p>
+          <a:p>
+            <a:r>
+              <a:t>Long-term (3-6 months):</a:t>
+            </a:r>
+          </a:p>
+          <a:p>
+            <a:r>
+              <a:t>• Implement workforce management system</a:t>
+            </a:r>
+          </a:p>
+          <a:p>
+            <a:r>
+              <a:t>• Establish monitoring process</a:t>
+            </a:r>
+          </a:p>
+        </p:txBody>
+      </p:sp>
+    </p:spTree>
+  </p:cSld>
+  <p:clrMapOvr>
+    <a:masterClrMapping/>
+  </p:clrMapOvr>
+</p:sld>
+</file>
+
+<file path=ppt/slides/slide8.xml><?xml version="1.0" encoding="utf-8"?>
+<p:sld xmlns:a="http://schemas.openxmlformats.org/drawingml/2006/main" xmlns:p="http://schemas.openxmlformats.org/presentationml/2006/main" xmlns:r="http://schemas.openxmlformats.org/officeDocument/2006/relationships">
+  <p:cSld>
+    <p:spTree>
+      <p:nvGrpSpPr>
+        <p:cNvPr id="1" name=""/>
+        <p:cNvGrpSpPr/>
+        <p:nvPr/>
+      </p:nvGrpSpPr>
+      <p:grpSpPr/>
+      <p:sp>
+        <p:nvSpPr>
+          <p:cNvPr id="2" name="Title 1"/>
+          <p:cNvSpPr>
+            <a:spLocks noGrp="1"/>
+          </p:cNvSpPr>
+          <p:nvPr>
+            <p:ph type="title"/>
+          </p:nvPr>
+        </p:nvSpPr>
+        <p:spPr/>
+        <p:txBody>
+          <a:bodyPr/>
+          <a:lstStyle/>
+          <a:p>
+            <a:r>
+              <a:t>Availability Analysis</a:t>
+            </a:r>
+          </a:p>
+        </p:txBody>
+      </p:sp>
+      <p:sp>
+        <p:nvSpPr>
+          <p:cNvPr id="3" name="Content Placeholder 2"/>
+          <p:cNvSpPr>
+            <a:spLocks noGrp="1"/>
+          </p:cNvSpPr>
+          <p:nvPr>
+            <p:ph idx="1"/>
+          </p:nvPr>
+        </p:nvSpPr>
+        <p:spPr/>
+        <p:txBody>
+          <a:bodyPr/>
+          <a:lstStyle/>
+          <a:p/>
+        </p:txBody>
+      </p:sp>
+      <p:pic>
+        <p:nvPicPr>
+          <p:cNvPr id="4" name="Picture 3" descr="daily_availability.png"/>
+          <p:cNvPicPr>
+            <a:picLocks noChangeAspect="1"/>
+          </p:cNvPicPr>
+          <p:nvPr/>
+        </p:nvPicPr>
+        <p:blipFill>
+          <a:blip r:embed="rId2"/>
+          <a:stretch>
+            <a:fillRect/>
+          </a:stretch>
+        </p:blipFill>
+        <p:spPr>
+          <a:xfrm>
+            <a:off x="914400" y="1828800"/>
+            <a:ext cx="7315200" cy="3657600"/>
+          </a:xfrm>
+          <a:prstGeom prst="rect">
+            <a:avLst/>
+          </a:prstGeom>
+        </p:spPr>
+      </p:pic>
     </p:spTree>
   </p:cSld>
   <p:clrMapOvr>

</xml_diff>